<commit_message>
updated merchant process chart
</commit_message>
<xml_diff>
--- a/public/downloads/MerchantProcessChart.pptx
+++ b/public/downloads/MerchantProcessChart.pptx
@@ -870,7 +870,7 @@
         <a:p>
           <a:r>
             <a:rPr lang="en-US" dirty="0" smtClean="0"/>
-            <a:t>Consultation</a:t>
+            <a:t>Consult</a:t>
           </a:r>
           <a:endParaRPr lang="en-US" dirty="0"/>
         </a:p>
@@ -907,7 +907,7 @@
         <a:p>
           <a:r>
             <a:rPr lang="en-US" dirty="0" smtClean="0"/>
-            <a:t>Agreement</a:t>
+            <a:t>Agree</a:t>
           </a:r>
           <a:endParaRPr lang="en-US" dirty="0"/>
         </a:p>
@@ -944,7 +944,7 @@
         <a:p>
           <a:r>
             <a:rPr lang="en-US" dirty="0" smtClean="0"/>
-            <a:t>Narrative</a:t>
+            <a:t>Write</a:t>
           </a:r>
           <a:endParaRPr lang="en-US" dirty="0"/>
         </a:p>
@@ -1018,7 +1018,7 @@
         <a:p>
           <a:r>
             <a:rPr lang="en-US" dirty="0" smtClean="0"/>
-            <a:t>Activation</a:t>
+            <a:t>Activate</a:t>
           </a:r>
           <a:endParaRPr lang="en-US" dirty="0"/>
         </a:p>
@@ -1070,6 +1070,13 @@
         </dgm:presLayoutVars>
       </dgm:prSet>
       <dgm:spPr/>
+      <dgm:t>
+        <a:bodyPr/>
+        <a:lstStyle/>
+        <a:p>
+          <a:endParaRPr lang="en-US"/>
+        </a:p>
+      </dgm:t>
     </dgm:pt>
     <dgm:pt modelId="{DC5F42ED-EE97-43B9-A83F-C13AAE620665}" type="pres">
       <dgm:prSet presAssocID="{ACC930AF-F43D-4A2C-8124-08D68F17403B}" presName="sibTrans" presStyleCnt="0"/>
@@ -1082,6 +1089,13 @@
         </dgm:presLayoutVars>
       </dgm:prSet>
       <dgm:spPr/>
+      <dgm:t>
+        <a:bodyPr/>
+        <a:lstStyle/>
+        <a:p>
+          <a:endParaRPr lang="en-US"/>
+        </a:p>
+      </dgm:t>
     </dgm:pt>
     <dgm:pt modelId="{EFC48230-8349-4C6D-9368-740D4903C255}" type="pres">
       <dgm:prSet presAssocID="{530C861C-BF9E-413C-A346-74A593C71FEA}" presName="sibTrans" presStyleCnt="0"/>
@@ -1094,6 +1108,13 @@
         </dgm:presLayoutVars>
       </dgm:prSet>
       <dgm:spPr/>
+      <dgm:t>
+        <a:bodyPr/>
+        <a:lstStyle/>
+        <a:p>
+          <a:endParaRPr lang="en-US"/>
+        </a:p>
+      </dgm:t>
     </dgm:pt>
     <dgm:pt modelId="{D5A40D5E-BFAA-4645-84C0-865C9DEBC103}" type="pres">
       <dgm:prSet presAssocID="{FECC7747-8E9C-42A4-89A5-0A3A9CF702C8}" presName="sibTrans" presStyleCnt="0"/>
@@ -1106,6 +1127,13 @@
         </dgm:presLayoutVars>
       </dgm:prSet>
       <dgm:spPr/>
+      <dgm:t>
+        <a:bodyPr/>
+        <a:lstStyle/>
+        <a:p>
+          <a:endParaRPr lang="en-US"/>
+        </a:p>
+      </dgm:t>
     </dgm:pt>
     <dgm:pt modelId="{C514364F-1203-47A6-BEC7-E0E7456F6218}" type="pres">
       <dgm:prSet presAssocID="{9F262F33-AF00-4FF5-B147-896C4A690048}" presName="sibTrans" presStyleCnt="0"/>
@@ -1118,6 +1146,13 @@
         </dgm:presLayoutVars>
       </dgm:prSet>
       <dgm:spPr/>
+      <dgm:t>
+        <a:bodyPr/>
+        <a:lstStyle/>
+        <a:p>
+          <a:endParaRPr lang="en-US"/>
+        </a:p>
+      </dgm:t>
     </dgm:pt>
   </dgm:ptLst>
   <dgm:cxnLst>
@@ -1209,8 +1244,8 @@
       </dsp:nvSpPr>
       <dsp:spPr>
         <a:xfrm>
-          <a:off x="1955" y="685799"/>
-          <a:ext cx="1160612" cy="914400"/>
+          <a:off x="269" y="685799"/>
+          <a:ext cx="1131819" cy="914400"/>
         </a:xfrm>
         <a:prstGeom prst="roundRect">
           <a:avLst/>
@@ -1251,12 +1286,12 @@
         </a:fontRef>
       </dsp:style>
       <dsp:txBody>
-        <a:bodyPr spcFirstLastPara="0" vert="horz" wrap="square" lIns="53340" tIns="53340" rIns="53340" bIns="53340" numCol="1" spcCol="1270" anchor="ctr" anchorCtr="0">
+        <a:bodyPr spcFirstLastPara="0" vert="horz" wrap="square" lIns="80010" tIns="80010" rIns="80010" bIns="80010" numCol="1" spcCol="1270" anchor="ctr" anchorCtr="0">
           <a:noAutofit/>
         </a:bodyPr>
         <a:lstStyle/>
         <a:p>
-          <a:pPr lvl="0" algn="ctr" defTabSz="622300">
+          <a:pPr lvl="0" algn="ctr" defTabSz="933450">
             <a:lnSpc>
               <a:spcPct val="90000"/>
             </a:lnSpc>
@@ -1268,15 +1303,15 @@
             </a:spcAft>
           </a:pPr>
           <a:r>
-            <a:rPr lang="en-US" sz="1400" kern="1200" dirty="0" smtClean="0"/>
-            <a:t>Consultation</a:t>
+            <a:rPr lang="en-US" sz="2100" kern="1200" dirty="0" smtClean="0"/>
+            <a:t>Consult</a:t>
           </a:r>
-          <a:endParaRPr lang="en-US" sz="1400" kern="1200" dirty="0"/>
+          <a:endParaRPr lang="en-US" sz="2100" kern="1200" dirty="0"/>
         </a:p>
       </dsp:txBody>
       <dsp:txXfrm>
-        <a:off x="46592" y="730436"/>
-        <a:ext cx="1071338" cy="825126"/>
+        <a:off x="44906" y="730436"/>
+        <a:ext cx="1042545" cy="825126"/>
       </dsp:txXfrm>
     </dsp:sp>
     <dsp:sp modelId="{F049036E-C3E0-4469-9A45-123496BB08B6}">
@@ -1286,8 +1321,8 @@
       </dsp:nvSpPr>
       <dsp:spPr>
         <a:xfrm>
-          <a:off x="1234824" y="685799"/>
-          <a:ext cx="1160612" cy="914400"/>
+          <a:off x="1241180" y="685799"/>
+          <a:ext cx="1131819" cy="914400"/>
         </a:xfrm>
         <a:prstGeom prst="roundRect">
           <a:avLst/>
@@ -1328,12 +1363,12 @@
         </a:fontRef>
       </dsp:style>
       <dsp:txBody>
-        <a:bodyPr spcFirstLastPara="0" vert="horz" wrap="square" lIns="53340" tIns="53340" rIns="53340" bIns="53340" numCol="1" spcCol="1270" anchor="ctr" anchorCtr="0">
+        <a:bodyPr spcFirstLastPara="0" vert="horz" wrap="square" lIns="80010" tIns="80010" rIns="80010" bIns="80010" numCol="1" spcCol="1270" anchor="ctr" anchorCtr="0">
           <a:noAutofit/>
         </a:bodyPr>
         <a:lstStyle/>
         <a:p>
-          <a:pPr lvl="0" algn="ctr" defTabSz="622300">
+          <a:pPr lvl="0" algn="ctr" defTabSz="933450">
             <a:lnSpc>
               <a:spcPct val="90000"/>
             </a:lnSpc>
@@ -1345,15 +1380,15 @@
             </a:spcAft>
           </a:pPr>
           <a:r>
-            <a:rPr lang="en-US" sz="1400" kern="1200" dirty="0" smtClean="0"/>
-            <a:t>Agreement</a:t>
+            <a:rPr lang="en-US" sz="2100" kern="1200" dirty="0" smtClean="0"/>
+            <a:t>Agree</a:t>
           </a:r>
-          <a:endParaRPr lang="en-US" sz="1400" kern="1200" dirty="0"/>
+          <a:endParaRPr lang="en-US" sz="2100" kern="1200" dirty="0"/>
         </a:p>
       </dsp:txBody>
       <dsp:txXfrm>
-        <a:off x="1279461" y="730436"/>
-        <a:ext cx="1071338" cy="825126"/>
+        <a:off x="1285817" y="730436"/>
+        <a:ext cx="1042545" cy="825126"/>
       </dsp:txXfrm>
     </dsp:sp>
     <dsp:sp modelId="{A444D88E-5DF9-4D12-B0DB-CE7217415FD0}">
@@ -1363,8 +1398,8 @@
       </dsp:nvSpPr>
       <dsp:spPr>
         <a:xfrm>
-          <a:off x="2467693" y="685799"/>
-          <a:ext cx="1160612" cy="914400"/>
+          <a:off x="2482090" y="685799"/>
+          <a:ext cx="1131819" cy="914400"/>
         </a:xfrm>
         <a:prstGeom prst="roundRect">
           <a:avLst/>
@@ -1405,12 +1440,12 @@
         </a:fontRef>
       </dsp:style>
       <dsp:txBody>
-        <a:bodyPr spcFirstLastPara="0" vert="horz" wrap="square" lIns="53340" tIns="53340" rIns="53340" bIns="53340" numCol="1" spcCol="1270" anchor="ctr" anchorCtr="0">
+        <a:bodyPr spcFirstLastPara="0" vert="horz" wrap="square" lIns="80010" tIns="80010" rIns="80010" bIns="80010" numCol="1" spcCol="1270" anchor="ctr" anchorCtr="0">
           <a:noAutofit/>
         </a:bodyPr>
         <a:lstStyle/>
         <a:p>
-          <a:pPr lvl="0" algn="ctr" defTabSz="622300">
+          <a:pPr lvl="0" algn="ctr" defTabSz="933450">
             <a:lnSpc>
               <a:spcPct val="90000"/>
             </a:lnSpc>
@@ -1422,15 +1457,15 @@
             </a:spcAft>
           </a:pPr>
           <a:r>
-            <a:rPr lang="en-US" sz="1400" kern="1200" dirty="0" smtClean="0"/>
-            <a:t>Narrative</a:t>
+            <a:rPr lang="en-US" sz="2100" kern="1200" dirty="0" smtClean="0"/>
+            <a:t>Write</a:t>
           </a:r>
-          <a:endParaRPr lang="en-US" sz="1400" kern="1200" dirty="0"/>
+          <a:endParaRPr lang="en-US" sz="2100" kern="1200" dirty="0"/>
         </a:p>
       </dsp:txBody>
       <dsp:txXfrm>
-        <a:off x="2512330" y="730436"/>
-        <a:ext cx="1071338" cy="825126"/>
+        <a:off x="2526727" y="730436"/>
+        <a:ext cx="1042545" cy="825126"/>
       </dsp:txXfrm>
     </dsp:sp>
     <dsp:sp modelId="{497C7BBF-4944-46A4-85F9-6814019408DA}">
@@ -1440,8 +1475,8 @@
       </dsp:nvSpPr>
       <dsp:spPr>
         <a:xfrm>
-          <a:off x="3700562" y="685799"/>
-          <a:ext cx="1160612" cy="914400"/>
+          <a:off x="3723000" y="685799"/>
+          <a:ext cx="1131819" cy="914400"/>
         </a:xfrm>
         <a:prstGeom prst="roundRect">
           <a:avLst/>
@@ -1482,12 +1517,12 @@
         </a:fontRef>
       </dsp:style>
       <dsp:txBody>
-        <a:bodyPr spcFirstLastPara="0" vert="horz" wrap="square" lIns="53340" tIns="53340" rIns="53340" bIns="53340" numCol="1" spcCol="1270" anchor="ctr" anchorCtr="0">
+        <a:bodyPr spcFirstLastPara="0" vert="horz" wrap="square" lIns="80010" tIns="80010" rIns="80010" bIns="80010" numCol="1" spcCol="1270" anchor="ctr" anchorCtr="0">
           <a:noAutofit/>
         </a:bodyPr>
         <a:lstStyle/>
         <a:p>
-          <a:pPr lvl="0" algn="ctr" defTabSz="622300">
+          <a:pPr lvl="0" algn="ctr" defTabSz="933450">
             <a:lnSpc>
               <a:spcPct val="90000"/>
             </a:lnSpc>
@@ -1499,15 +1534,15 @@
             </a:spcAft>
           </a:pPr>
           <a:r>
-            <a:rPr lang="en-US" sz="1400" kern="1200" dirty="0" smtClean="0"/>
+            <a:rPr lang="en-US" sz="2100" kern="1200" dirty="0" smtClean="0"/>
             <a:t>Review</a:t>
           </a:r>
-          <a:endParaRPr lang="en-US" sz="1400" kern="1200" dirty="0"/>
+          <a:endParaRPr lang="en-US" sz="2100" kern="1200" dirty="0"/>
         </a:p>
       </dsp:txBody>
       <dsp:txXfrm>
-        <a:off x="3745199" y="730436"/>
-        <a:ext cx="1071338" cy="825126"/>
+        <a:off x="3767637" y="730436"/>
+        <a:ext cx="1042545" cy="825126"/>
       </dsp:txXfrm>
     </dsp:sp>
     <dsp:sp modelId="{0B0232C1-A0DD-4734-89DD-2D0A564AF181}">
@@ -1517,8 +1552,8 @@
       </dsp:nvSpPr>
       <dsp:spPr>
         <a:xfrm>
-          <a:off x="4933431" y="685799"/>
-          <a:ext cx="1160612" cy="914400"/>
+          <a:off x="4963910" y="685799"/>
+          <a:ext cx="1131819" cy="914400"/>
         </a:xfrm>
         <a:prstGeom prst="roundRect">
           <a:avLst/>
@@ -1559,12 +1594,12 @@
         </a:fontRef>
       </dsp:style>
       <dsp:txBody>
-        <a:bodyPr spcFirstLastPara="0" vert="horz" wrap="square" lIns="53340" tIns="53340" rIns="53340" bIns="53340" numCol="1" spcCol="1270" anchor="ctr" anchorCtr="0">
+        <a:bodyPr spcFirstLastPara="0" vert="horz" wrap="square" lIns="80010" tIns="80010" rIns="80010" bIns="80010" numCol="1" spcCol="1270" anchor="ctr" anchorCtr="0">
           <a:noAutofit/>
         </a:bodyPr>
         <a:lstStyle/>
         <a:p>
-          <a:pPr lvl="0" algn="ctr" defTabSz="622300">
+          <a:pPr lvl="0" algn="ctr" defTabSz="933450">
             <a:lnSpc>
               <a:spcPct val="90000"/>
             </a:lnSpc>
@@ -1576,15 +1611,15 @@
             </a:spcAft>
           </a:pPr>
           <a:r>
-            <a:rPr lang="en-US" sz="1400" kern="1200" dirty="0" smtClean="0"/>
-            <a:t>Activation</a:t>
+            <a:rPr lang="en-US" sz="2100" kern="1200" dirty="0" smtClean="0"/>
+            <a:t>Activate</a:t>
           </a:r>
-          <a:endParaRPr lang="en-US" sz="1400" kern="1200" dirty="0"/>
+          <a:endParaRPr lang="en-US" sz="2100" kern="1200" dirty="0"/>
         </a:p>
       </dsp:txBody>
       <dsp:txXfrm>
-        <a:off x="4978068" y="730436"/>
-        <a:ext cx="1071338" cy="825126"/>
+        <a:off x="5008547" y="730436"/>
+        <a:ext cx="1042545" cy="825126"/>
       </dsp:txXfrm>
     </dsp:sp>
   </dsp:spTree>
@@ -2960,7 +2995,7 @@
           <a:p>
             <a:fld id="{72AA7E5B-63CF-4BEA-8549-19C48D312442}" type="datetimeFigureOut">
               <a:rPr lang="en-US" smtClean="0"/>
-              <a:t>4/26/2011</a:t>
+              <a:t>4/30/2011</a:t>
             </a:fld>
             <a:endParaRPr lang="en-US"/>
           </a:p>
@@ -3130,7 +3165,7 @@
           <a:p>
             <a:fld id="{72AA7E5B-63CF-4BEA-8549-19C48D312442}" type="datetimeFigureOut">
               <a:rPr lang="en-US" smtClean="0"/>
-              <a:t>4/26/2011</a:t>
+              <a:t>4/30/2011</a:t>
             </a:fld>
             <a:endParaRPr lang="en-US"/>
           </a:p>
@@ -3310,7 +3345,7 @@
           <a:p>
             <a:fld id="{72AA7E5B-63CF-4BEA-8549-19C48D312442}" type="datetimeFigureOut">
               <a:rPr lang="en-US" smtClean="0"/>
-              <a:t>4/26/2011</a:t>
+              <a:t>4/30/2011</a:t>
             </a:fld>
             <a:endParaRPr lang="en-US"/>
           </a:p>
@@ -3480,7 +3515,7 @@
           <a:p>
             <a:fld id="{72AA7E5B-63CF-4BEA-8549-19C48D312442}" type="datetimeFigureOut">
               <a:rPr lang="en-US" smtClean="0"/>
-              <a:t>4/26/2011</a:t>
+              <a:t>4/30/2011</a:t>
             </a:fld>
             <a:endParaRPr lang="en-US"/>
           </a:p>
@@ -3726,7 +3761,7 @@
           <a:p>
             <a:fld id="{72AA7E5B-63CF-4BEA-8549-19C48D312442}" type="datetimeFigureOut">
               <a:rPr lang="en-US" smtClean="0"/>
-              <a:t>4/26/2011</a:t>
+              <a:t>4/30/2011</a:t>
             </a:fld>
             <a:endParaRPr lang="en-US"/>
           </a:p>
@@ -4014,7 +4049,7 @@
           <a:p>
             <a:fld id="{72AA7E5B-63CF-4BEA-8549-19C48D312442}" type="datetimeFigureOut">
               <a:rPr lang="en-US" smtClean="0"/>
-              <a:t>4/26/2011</a:t>
+              <a:t>4/30/2011</a:t>
             </a:fld>
             <a:endParaRPr lang="en-US"/>
           </a:p>
@@ -4441,7 +4476,7 @@
           <a:p>
             <a:fld id="{72AA7E5B-63CF-4BEA-8549-19C48D312442}" type="datetimeFigureOut">
               <a:rPr lang="en-US" smtClean="0"/>
-              <a:t>4/26/2011</a:t>
+              <a:t>4/30/2011</a:t>
             </a:fld>
             <a:endParaRPr lang="en-US"/>
           </a:p>
@@ -4559,7 +4594,7 @@
           <a:p>
             <a:fld id="{72AA7E5B-63CF-4BEA-8549-19C48D312442}" type="datetimeFigureOut">
               <a:rPr lang="en-US" smtClean="0"/>
-              <a:t>4/26/2011</a:t>
+              <a:t>4/30/2011</a:t>
             </a:fld>
             <a:endParaRPr lang="en-US"/>
           </a:p>
@@ -4654,7 +4689,7 @@
           <a:p>
             <a:fld id="{72AA7E5B-63CF-4BEA-8549-19C48D312442}" type="datetimeFigureOut">
               <a:rPr lang="en-US" smtClean="0"/>
-              <a:t>4/26/2011</a:t>
+              <a:t>4/30/2011</a:t>
             </a:fld>
             <a:endParaRPr lang="en-US"/>
           </a:p>
@@ -4931,7 +4966,7 @@
           <a:p>
             <a:fld id="{72AA7E5B-63CF-4BEA-8549-19C48D312442}" type="datetimeFigureOut">
               <a:rPr lang="en-US" smtClean="0"/>
-              <a:t>4/26/2011</a:t>
+              <a:t>4/30/2011</a:t>
             </a:fld>
             <a:endParaRPr lang="en-US"/>
           </a:p>
@@ -5184,7 +5219,7 @@
           <a:p>
             <a:fld id="{72AA7E5B-63CF-4BEA-8549-19C48D312442}" type="datetimeFigureOut">
               <a:rPr lang="en-US" smtClean="0"/>
-              <a:t>4/26/2011</a:t>
+              <a:t>4/30/2011</a:t>
             </a:fld>
             <a:endParaRPr lang="en-US"/>
           </a:p>
@@ -5397,7 +5432,7 @@
           <a:p>
             <a:fld id="{72AA7E5B-63CF-4BEA-8549-19C48D312442}" type="datetimeFigureOut">
               <a:rPr lang="en-US" smtClean="0"/>
-              <a:t>4/26/2011</a:t>
+              <a:t>4/30/2011</a:t>
             </a:fld>
             <a:endParaRPr lang="en-US"/>
           </a:p>
@@ -5779,7 +5814,7 @@
           <p:nvPr>
             <p:extLst>
               <p:ext uri="{D42A27DB-BD31-4B8C-83A1-F6EECF244321}">
-                <p14:modId xmlns:p14="http://schemas.microsoft.com/office/powerpoint/2010/main" val="178658056"/>
+                <p14:modId xmlns:p14="http://schemas.microsoft.com/office/powerpoint/2010/main" val="2445722071"/>
               </p:ext>
             </p:extLst>
           </p:nvPr>
@@ -6121,7 +6156,7 @@
       </p:sp>
       <p:pic>
         <p:nvPicPr>
-          <p:cNvPr id="16" name="Picture 15"/>
+          <p:cNvPr id="2" name="Picture 1"/>
           <p:cNvPicPr>
             <a:picLocks noChangeAspect="1"/>
           </p:cNvPicPr>
@@ -6141,8 +6176,8 @@
         </p:blipFill>
         <p:spPr>
           <a:xfrm>
-            <a:off x="2895600" y="1295400"/>
-            <a:ext cx="2971429" cy="965079"/>
+            <a:off x="2106468" y="1143000"/>
+            <a:ext cx="3898900" cy="1167508"/>
           </a:xfrm>
           <a:prstGeom prst="rect">
             <a:avLst/>

</xml_diff>